<commit_message>
image sources, finals (as sent to MITP 4Sep2018)
with corrections suggested by proofreader
</commit_message>
<xml_diff>
--- a/Sources/full-adder.pptx
+++ b/Sources/full-adder.pptx
@@ -17,14 +17,14 @@
   <p:notesSz cx="7315200" cy="9601200"/>
   <p:embeddedFontLst>
     <p:embeddedFont>
-      <p:font typeface="Calibri" panose="020F0502020204030204" pitchFamily="34" charset="0"/>
+      <p:font typeface="Arial Narrow" panose="020B0606020202030204" pitchFamily="34" charset="0"/>
       <p:regular r:id="rId5"/>
       <p:bold r:id="rId6"/>
       <p:italic r:id="rId7"/>
       <p:boldItalic r:id="rId8"/>
     </p:embeddedFont>
     <p:embeddedFont>
-      <p:font typeface="Arial Narrow" panose="020B0606020202030204" pitchFamily="34" charset="0"/>
+      <p:font typeface="Calibri" panose="020F0502020204030204" pitchFamily="34" charset="0"/>
       <p:regular r:id="rId9"/>
       <p:bold r:id="rId10"/>
       <p:italic r:id="rId11"/>
@@ -196,10 +196,6 @@
 </p:presentation>
 </file>
 
-<file path=ppt/revisionInfo.xml><?xml version="1.0" encoding="utf-8"?>
-<p1510:revInfo xmlns:a="http://schemas.openxmlformats.org/drawingml/2006/main" xmlns:r="http://schemas.openxmlformats.org/officeDocument/2006/relationships" xmlns:p1510="http://schemas.microsoft.com/office/powerpoint/2015/10/main"/>
-</file>
-
 <file path=ppt/handoutMasters/handoutMaster1.xml><?xml version="1.0" encoding="utf-8"?>
 <p:handoutMaster xmlns:a="http://schemas.openxmlformats.org/drawingml/2006/main" xmlns:r="http://schemas.openxmlformats.org/officeDocument/2006/relationships" xmlns:p="http://schemas.openxmlformats.org/presentationml/2006/main">
   <p:cSld>
@@ -330,7 +326,7 @@
               <a:pPr>
                 <a:defRPr/>
               </a:pPr>
-              <a:t>2/2/2018</a:t>
+              <a:t>7/22/2018</a:t>
             </a:fld>
             <a:endParaRPr lang="en-US"/>
           </a:p>
@@ -584,7 +580,7 @@
               <a:pPr>
                 <a:defRPr/>
               </a:pPr>
-              <a:t>2/2/2018</a:t>
+              <a:t>7/22/2018</a:t>
             </a:fld>
             <a:endParaRPr lang="en-US"/>
           </a:p>
@@ -1094,7 +1090,7 @@
               <a:pPr>
                 <a:defRPr/>
               </a:pPr>
-              <a:t>2/2/2018</a:t>
+              <a:t>7/22/2018</a:t>
             </a:fld>
             <a:endParaRPr lang="en-US"/>
           </a:p>
@@ -1313,7 +1309,7 @@
               <a:pPr>
                 <a:defRPr/>
               </a:pPr>
-              <a:t>2/2/2018</a:t>
+              <a:t>7/22/2018</a:t>
             </a:fld>
             <a:endParaRPr lang="en-US"/>
           </a:p>
@@ -1542,7 +1538,7 @@
               <a:pPr>
                 <a:defRPr/>
               </a:pPr>
-              <a:t>2/2/2018</a:t>
+              <a:t>7/22/2018</a:t>
             </a:fld>
             <a:endParaRPr lang="en-US"/>
           </a:p>
@@ -1761,7 +1757,7 @@
               <a:pPr>
                 <a:defRPr/>
               </a:pPr>
-              <a:t>2/2/2018</a:t>
+              <a:t>7/22/2018</a:t>
             </a:fld>
             <a:endParaRPr lang="en-US"/>
           </a:p>
@@ -2003,7 +1999,7 @@
               <a:pPr>
                 <a:defRPr/>
               </a:pPr>
-              <a:t>2/2/2018</a:t>
+              <a:t>7/22/2018</a:t>
             </a:fld>
             <a:endParaRPr lang="en-US"/>
           </a:p>
@@ -2339,7 +2335,7 @@
               <a:pPr>
                 <a:defRPr/>
               </a:pPr>
-              <a:t>2/2/2018</a:t>
+              <a:t>7/22/2018</a:t>
             </a:fld>
             <a:endParaRPr lang="en-US"/>
           </a:p>
@@ -2814,7 +2810,7 @@
               <a:pPr>
                 <a:defRPr/>
               </a:pPr>
-              <a:t>2/2/2018</a:t>
+              <a:t>7/22/2018</a:t>
             </a:fld>
             <a:endParaRPr lang="en-US"/>
           </a:p>
@@ -2982,7 +2978,7 @@
               <a:pPr>
                 <a:defRPr/>
               </a:pPr>
-              <a:t>2/2/2018</a:t>
+              <a:t>7/22/2018</a:t>
             </a:fld>
             <a:endParaRPr lang="en-US"/>
           </a:p>
@@ -3128,7 +3124,7 @@
               <a:pPr>
                 <a:defRPr/>
               </a:pPr>
-              <a:t>2/2/2018</a:t>
+              <a:t>7/22/2018</a:t>
             </a:fld>
             <a:endParaRPr lang="en-US"/>
           </a:p>
@@ -3454,7 +3450,7 @@
               <a:pPr>
                 <a:defRPr/>
               </a:pPr>
-              <a:t>2/2/2018</a:t>
+              <a:t>7/22/2018</a:t>
             </a:fld>
             <a:endParaRPr lang="en-US"/>
           </a:p>
@@ -3758,7 +3754,7 @@
               <a:pPr>
                 <a:defRPr/>
               </a:pPr>
-              <a:t>2/2/2018</a:t>
+              <a:t>7/22/2018</a:t>
             </a:fld>
             <a:endParaRPr lang="en-US"/>
           </a:p>
@@ -4086,7 +4082,7 @@
               <a:pPr>
                 <a:defRPr/>
               </a:pPr>
-              <a:t>2/2/2018</a:t>
+              <a:t>7/22/2018</a:t>
             </a:fld>
             <a:endParaRPr lang="en-US"/>
           </a:p>
@@ -5063,7 +5059,7 @@
                   <a:latin typeface="Calibri" panose="020F0502020204030204" pitchFamily="34" charset="0"/>
                   <a:cs typeface="Calibri" panose="020F0502020204030204" pitchFamily="34" charset="0"/>
                 </a:rPr>
-                <a:t>half</a:t>
+                <a:t>half-</a:t>
               </a:r>
             </a:p>
             <a:p>
@@ -9994,7 +9990,7 @@
                   <a:latin typeface="Calibri" panose="020F0502020204030204" pitchFamily="34" charset="0"/>
                   <a:cs typeface="Calibri" panose="020F0502020204030204" pitchFamily="34" charset="0"/>
                 </a:rPr>
-                <a:t>full</a:t>
+                <a:t>full-</a:t>
               </a:r>
             </a:p>
             <a:p>
@@ -11661,7 +11657,7 @@
           <p:spPr bwMode="auto">
             <a:xfrm>
               <a:off x="1771225" y="3086833"/>
-              <a:ext cx="277812" cy="215900"/>
+              <a:ext cx="331822" cy="215444"/>
             </a:xfrm>
             <a:prstGeom prst="rect">
               <a:avLst/>
@@ -11835,7 +11831,7 @@
                   <a:latin typeface="Calibri" panose="020F0502020204030204" pitchFamily="34" charset="0"/>
                   <a:cs typeface="Calibri" panose="020F0502020204030204" pitchFamily="34" charset="0"/>
                 </a:rPr>
-                <a:t>half</a:t>
+                <a:t>half-</a:t>
               </a:r>
               <a:endParaRPr lang="en-US" altLang="en-US" sz="1400">
                 <a:solidFill>
@@ -15159,7 +15155,7 @@
             <p:spPr bwMode="auto">
               <a:xfrm>
                 <a:off x="3110714" y="3710208"/>
-                <a:ext cx="277812" cy="215900"/>
+                <a:ext cx="331822" cy="215444"/>
               </a:xfrm>
               <a:prstGeom prst="rect">
                 <a:avLst/>
@@ -15333,7 +15329,7 @@
                     <a:latin typeface="Calibri" panose="020F0502020204030204" pitchFamily="34" charset="0"/>
                     <a:cs typeface="Calibri" panose="020F0502020204030204" pitchFamily="34" charset="0"/>
                   </a:rPr>
-                  <a:t>half</a:t>
+                  <a:t>half-</a:t>
                 </a:r>
                 <a:endParaRPr lang="en-US" altLang="en-US" sz="1400">
                   <a:solidFill>

</xml_diff>